<commit_message>
update release deck cudf updates
</commit_message>
<xml_diff>
--- a/overview/RAPIDS 21.06 Release Deck.pptx
+++ b/overview/RAPIDS 21.06 Release Deck.pptx
@@ -21635,7 +21635,7 @@
             <a:tbl>
               <a:tblPr>
                 <a:noFill/>
-                <a:tableStyleId>{65D0C91D-AB13-4302-B170-993CA9033B2A}</a:tableStyleId>
+                <a:tableStyleId>{EA9895FB-8940-458F-A949-C03656F2F5DD}</a:tableStyleId>
               </a:tblPr>
               <a:tblGrid>
                 <a:gridCol w="5461000"/>
@@ -23259,7 +23259,7 @@
                   <a:schemeClr val="dk2"/>
                 </a:solidFill>
               </a:rPr>
-              <a:t>Add </a:t>
+              <a:t>Added </a:t>
             </a:r>
             <a:r>
               <a:rPr i="1" lang="en-US">
@@ -23271,15 +23271,15 @@
                 <a:cs typeface="Nunito"/>
                 <a:sym typeface="Nunito"/>
               </a:rPr>
-              <a:t>join_list_elements</a:t>
+              <a:t>getitem </a:t>
             </a:r>
             <a:r>
-              <a:rPr i="1" lang="en-US">
+              <a:rPr lang="en-US">
                 <a:solidFill>
                   <a:schemeClr val="dk2"/>
                 </a:solidFill>
               </a:rPr>
-              <a:t>, </a:t>
+              <a:t>and</a:t>
             </a:r>
             <a:r>
               <a:rPr i="1" lang="en-US">
@@ -23291,7 +23291,7 @@
                 <a:cs typeface="Nunito"/>
                 <a:sym typeface="Nunito"/>
               </a:rPr>
-              <a:t>getitem, concatenate_list_elements</a:t>
+              <a:t> concatenate_list_elements</a:t>
             </a:r>
             <a:r>
               <a:rPr i="1" lang="en-US">
@@ -23307,7 +23307,7 @@
                   <a:schemeClr val="dk2"/>
                 </a:solidFill>
               </a:rPr>
-              <a:t>functions to List</a:t>
+              <a:t>functions to list in C++</a:t>
             </a:r>
             <a:endParaRPr>
               <a:solidFill>
@@ -23335,7 +23335,23 @@
                   <a:schemeClr val="dk2"/>
                 </a:solidFill>
               </a:rPr>
-              <a:t>Updates and enhancements of multiple string functionalities</a:t>
+              <a:t>Continuing refactoring and improving </a:t>
+            </a:r>
+            <a:r>
+              <a:rPr lang="en-US">
+                <a:solidFill>
+                  <a:schemeClr val="dk2"/>
+                </a:solidFill>
+              </a:rPr>
+              <a:t>string </a:t>
+            </a:r>
+            <a:r>
+              <a:rPr lang="en-US">
+                <a:solidFill>
+                  <a:schemeClr val="dk2"/>
+                </a:solidFill>
+              </a:rPr>
+              <a:t>support</a:t>
             </a:r>
             <a:endParaRPr>
               <a:solidFill>

</xml_diff>